<commit_message>
New day - new labs
trololo
</commit_message>
<xml_diff>
--- a/Fedyshyn Andriy/Лабораторна робота №3/Лабораторна робота №3.pptx
+++ b/Fedyshyn Andriy/Лабораторна робота №3/Лабораторна робота №3.pptx
@@ -4,6 +4,15 @@
   <p:sldMasterIdLst>
     <p:sldMasterId id="2147483648" r:id="rId1"/>
   </p:sldMasterIdLst>
+  <p:sldIdLst>
+    <p:sldId id="256" r:id="rId2"/>
+    <p:sldId id="257" r:id="rId3"/>
+    <p:sldId id="258" r:id="rId4"/>
+    <p:sldId id="259" r:id="rId5"/>
+    <p:sldId id="260" r:id="rId6"/>
+    <p:sldId id="261" r:id="rId7"/>
+    <p:sldId id="262" r:id="rId8"/>
+  </p:sldIdLst>
   <p:sldSz cx="9144000" cy="6858000" type="screen4x3"/>
   <p:notesSz cx="6858000" cy="9144000"/>
   <p:defaultTextStyle>
@@ -285,7 +294,7 @@
           <a:p>
             <a:fld id="{B4C71EC6-210F-42DE-9C53-41977AD35B3D}" type="datetimeFigureOut">
               <a:rPr lang="ru-RU" smtClean="0"/>
-              <a:t>12.11.2009</a:t>
+              <a:t>11.05.2016</a:t>
             </a:fld>
             <a:endParaRPr lang="ru-RU"/>
           </a:p>
@@ -450,7 +459,7 @@
           <a:p>
             <a:fld id="{B4C71EC6-210F-42DE-9C53-41977AD35B3D}" type="datetimeFigureOut">
               <a:rPr lang="ru-RU" smtClean="0"/>
-              <a:t>12.11.2009</a:t>
+              <a:t>11.05.2016</a:t>
             </a:fld>
             <a:endParaRPr lang="ru-RU"/>
           </a:p>
@@ -625,7 +634,7 @@
           <a:p>
             <a:fld id="{B4C71EC6-210F-42DE-9C53-41977AD35B3D}" type="datetimeFigureOut">
               <a:rPr lang="ru-RU" smtClean="0"/>
-              <a:t>12.11.2009</a:t>
+              <a:t>11.05.2016</a:t>
             </a:fld>
             <a:endParaRPr lang="ru-RU"/>
           </a:p>
@@ -790,7 +799,7 @@
           <a:p>
             <a:fld id="{B4C71EC6-210F-42DE-9C53-41977AD35B3D}" type="datetimeFigureOut">
               <a:rPr lang="ru-RU" smtClean="0"/>
-              <a:t>12.11.2009</a:t>
+              <a:t>11.05.2016</a:t>
             </a:fld>
             <a:endParaRPr lang="ru-RU"/>
           </a:p>
@@ -1031,7 +1040,7 @@
           <a:p>
             <a:fld id="{B4C71EC6-210F-42DE-9C53-41977AD35B3D}" type="datetimeFigureOut">
               <a:rPr lang="ru-RU" smtClean="0"/>
-              <a:t>12.11.2009</a:t>
+              <a:t>11.05.2016</a:t>
             </a:fld>
             <a:endParaRPr lang="ru-RU"/>
           </a:p>
@@ -1314,7 +1323,7 @@
           <a:p>
             <a:fld id="{B4C71EC6-210F-42DE-9C53-41977AD35B3D}" type="datetimeFigureOut">
               <a:rPr lang="ru-RU" smtClean="0"/>
-              <a:t>12.11.2009</a:t>
+              <a:t>11.05.2016</a:t>
             </a:fld>
             <a:endParaRPr lang="ru-RU"/>
           </a:p>
@@ -1731,7 +1740,7 @@
           <a:p>
             <a:fld id="{B4C71EC6-210F-42DE-9C53-41977AD35B3D}" type="datetimeFigureOut">
               <a:rPr lang="ru-RU" smtClean="0"/>
-              <a:t>12.11.2009</a:t>
+              <a:t>11.05.2016</a:t>
             </a:fld>
             <a:endParaRPr lang="ru-RU"/>
           </a:p>
@@ -1844,7 +1853,7 @@
           <a:p>
             <a:fld id="{B4C71EC6-210F-42DE-9C53-41977AD35B3D}" type="datetimeFigureOut">
               <a:rPr lang="ru-RU" smtClean="0"/>
-              <a:t>12.11.2009</a:t>
+              <a:t>11.05.2016</a:t>
             </a:fld>
             <a:endParaRPr lang="ru-RU"/>
           </a:p>
@@ -1934,7 +1943,7 @@
           <a:p>
             <a:fld id="{B4C71EC6-210F-42DE-9C53-41977AD35B3D}" type="datetimeFigureOut">
               <a:rPr lang="ru-RU" smtClean="0"/>
-              <a:t>12.11.2009</a:t>
+              <a:t>11.05.2016</a:t>
             </a:fld>
             <a:endParaRPr lang="ru-RU"/>
           </a:p>
@@ -2206,7 +2215,7 @@
           <a:p>
             <a:fld id="{B4C71EC6-210F-42DE-9C53-41977AD35B3D}" type="datetimeFigureOut">
               <a:rPr lang="ru-RU" smtClean="0"/>
-              <a:t>12.11.2009</a:t>
+              <a:t>11.05.2016</a:t>
             </a:fld>
             <a:endParaRPr lang="ru-RU"/>
           </a:p>
@@ -2454,7 +2463,7 @@
           <a:p>
             <a:fld id="{B4C71EC6-210F-42DE-9C53-41977AD35B3D}" type="datetimeFigureOut">
               <a:rPr lang="ru-RU" smtClean="0"/>
-              <a:t>12.11.2009</a:t>
+              <a:t>11.05.2016</a:t>
             </a:fld>
             <a:endParaRPr lang="ru-RU"/>
           </a:p>
@@ -2514,9 +2523,14 @@
 <p:sldMaster xmlns:a="http://schemas.openxmlformats.org/drawingml/2006/main" xmlns:r="http://schemas.openxmlformats.org/officeDocument/2006/relationships" xmlns:p="http://schemas.openxmlformats.org/presentationml/2006/main">
   <p:cSld>
     <p:bg>
-      <p:bgRef idx="1001">
-        <a:schemeClr val="bg1"/>
-      </p:bgRef>
+      <p:bgPr>
+        <a:blipFill dpi="0" rotWithShape="1">
+          <a:blip r:embed="rId13"/>
+          <a:srcRect/>
+          <a:tile tx="0" ty="0" sx="100000" sy="100000" flip="none" algn="tl"/>
+        </a:blipFill>
+        <a:effectLst/>
+      </p:bgPr>
     </p:bg>
     <p:spTree>
       <p:nvGrpSpPr>
@@ -2662,7 +2676,7 @@
           <a:p>
             <a:fld id="{B4C71EC6-210F-42DE-9C53-41977AD35B3D}" type="datetimeFigureOut">
               <a:rPr lang="ru-RU" smtClean="0"/>
-              <a:t>12.11.2009</a:t>
+              <a:t>11.05.2016</a:t>
             </a:fld>
             <a:endParaRPr lang="ru-RU"/>
           </a:p>
@@ -3013,6 +3027,1479 @@
     </p:otherStyle>
   </p:txStyles>
 </p:sldMaster>
+</file>
+
+<file path=ppt/slides/slide1.xml><?xml version="1.0" encoding="utf-8"?>
+<p:sld xmlns:a="http://schemas.openxmlformats.org/drawingml/2006/main" xmlns:r="http://schemas.openxmlformats.org/officeDocument/2006/relationships" xmlns:p="http://schemas.openxmlformats.org/presentationml/2006/main">
+  <p:cSld>
+    <p:spTree>
+      <p:nvGrpSpPr>
+        <p:cNvPr id="1" name=""/>
+        <p:cNvGrpSpPr/>
+        <p:nvPr/>
+      </p:nvGrpSpPr>
+      <p:grpSpPr>
+        <a:xfrm>
+          <a:off x="0" y="0"/>
+          <a:ext cx="0" cy="0"/>
+          <a:chOff x="0" y="0"/>
+          <a:chExt cx="0" cy="0"/>
+        </a:xfrm>
+      </p:grpSpPr>
+      <p:sp>
+        <p:nvSpPr>
+          <p:cNvPr id="7" name="Заголовок 1"/>
+          <p:cNvSpPr>
+            <a:spLocks noGrp="1"/>
+          </p:cNvSpPr>
+          <p:nvPr>
+            <p:ph type="ctrTitle"/>
+          </p:nvPr>
+        </p:nvSpPr>
+        <p:spPr>
+          <a:xfrm>
+            <a:off x="827584" y="620688"/>
+            <a:ext cx="7772400" cy="1470025"/>
+          </a:xfrm>
+        </p:spPr>
+        <p:txBody>
+          <a:bodyPr/>
+          <a:lstStyle/>
+          <a:p>
+            <a:r>
+              <a:rPr lang="uk-UA" dirty="0" smtClean="0">
+                <a:latin typeface="Times New Roman" pitchFamily="18" charset="0"/>
+                <a:cs typeface="Times New Roman" pitchFamily="18" charset="0"/>
+              </a:rPr>
+              <a:t>Лабораторна робота </a:t>
+            </a:r>
+            <a:r>
+              <a:rPr lang="uk-UA" dirty="0" smtClean="0">
+                <a:latin typeface="Times New Roman" pitchFamily="18" charset="0"/>
+                <a:cs typeface="Times New Roman" pitchFamily="18" charset="0"/>
+              </a:rPr>
+              <a:t>№3</a:t>
+            </a:r>
+            <a:endParaRPr lang="uk-UA" dirty="0">
+              <a:latin typeface="Times New Roman" pitchFamily="18" charset="0"/>
+              <a:cs typeface="Times New Roman" pitchFamily="18" charset="0"/>
+            </a:endParaRPr>
+          </a:p>
+        </p:txBody>
+      </p:sp>
+      <p:sp>
+        <p:nvSpPr>
+          <p:cNvPr id="8" name="Подзаголовок 2"/>
+          <p:cNvSpPr>
+            <a:spLocks noGrp="1"/>
+          </p:cNvSpPr>
+          <p:nvPr>
+            <p:ph type="subTitle" idx="1"/>
+          </p:nvPr>
+        </p:nvSpPr>
+        <p:spPr>
+          <a:xfrm>
+            <a:off x="1547664" y="2420888"/>
+            <a:ext cx="6400800" cy="1752600"/>
+          </a:xfrm>
+        </p:spPr>
+        <p:txBody>
+          <a:bodyPr>
+            <a:normAutofit fontScale="92500" lnSpcReduction="20000"/>
+          </a:bodyPr>
+          <a:lstStyle/>
+          <a:p>
+            <a:r>
+              <a:rPr lang="uk-UA" sz="4400" dirty="0" smtClean="0">
+                <a:solidFill>
+                  <a:schemeClr val="tx1"/>
+                </a:solidFill>
+                <a:latin typeface="Times New Roman" pitchFamily="18" charset="0"/>
+                <a:cs typeface="Times New Roman" pitchFamily="18" charset="0"/>
+              </a:rPr>
+              <a:t>«</a:t>
+            </a:r>
+            <a:r>
+              <a:rPr lang="uk-UA" sz="4400" b="1" i="1" dirty="0">
+                <a:solidFill>
+                  <a:schemeClr val="tx1"/>
+                </a:solidFill>
+                <a:latin typeface="Times New Roman" pitchFamily="18" charset="0"/>
+                <a:cs typeface="Times New Roman" pitchFamily="18" charset="0"/>
+              </a:rPr>
+              <a:t>Складання </a:t>
+            </a:r>
+            <a:r>
+              <a:rPr lang="en-US" sz="4400" b="1" i="1" dirty="0">
+                <a:solidFill>
+                  <a:schemeClr val="tx1"/>
+                </a:solidFill>
+                <a:latin typeface="Times New Roman" pitchFamily="18" charset="0"/>
+                <a:cs typeface="Times New Roman" pitchFamily="18" charset="0"/>
+              </a:rPr>
+              <a:t>User Story</a:t>
+            </a:r>
+            <a:r>
+              <a:rPr lang="uk-UA" sz="4400" b="1" i="1" dirty="0">
+                <a:solidFill>
+                  <a:schemeClr val="tx1"/>
+                </a:solidFill>
+                <a:latin typeface="Times New Roman" pitchFamily="18" charset="0"/>
+                <a:cs typeface="Times New Roman" pitchFamily="18" charset="0"/>
+              </a:rPr>
+              <a:t> для існуючого сайту чи додатку</a:t>
+            </a:r>
+            <a:r>
+              <a:rPr lang="uk-UA" sz="4400" dirty="0" smtClean="0">
+                <a:solidFill>
+                  <a:schemeClr val="tx1"/>
+                </a:solidFill>
+                <a:latin typeface="Times New Roman" pitchFamily="18" charset="0"/>
+                <a:cs typeface="Times New Roman" pitchFamily="18" charset="0"/>
+              </a:rPr>
+              <a:t>»</a:t>
+            </a:r>
+            <a:endParaRPr lang="uk-UA" sz="4400" dirty="0">
+              <a:solidFill>
+                <a:schemeClr val="tx1"/>
+              </a:solidFill>
+              <a:latin typeface="Times New Roman" pitchFamily="18" charset="0"/>
+              <a:cs typeface="Times New Roman" pitchFamily="18" charset="0"/>
+            </a:endParaRPr>
+          </a:p>
+        </p:txBody>
+      </p:sp>
+      <p:sp>
+        <p:nvSpPr>
+          <p:cNvPr id="9" name="TextBox 8"/>
+          <p:cNvSpPr txBox="1"/>
+          <p:nvPr/>
+        </p:nvSpPr>
+        <p:spPr>
+          <a:xfrm>
+            <a:off x="5220072" y="5085184"/>
+            <a:ext cx="3723392" cy="707886"/>
+          </a:xfrm>
+          <a:prstGeom prst="rect">
+            <a:avLst/>
+          </a:prstGeom>
+          <a:noFill/>
+        </p:spPr>
+        <p:txBody>
+          <a:bodyPr wrap="none" rtlCol="0">
+            <a:spAutoFit/>
+          </a:bodyPr>
+          <a:lstStyle/>
+          <a:p>
+            <a:r>
+              <a:rPr lang="uk-UA" sz="2000" dirty="0" smtClean="0">
+                <a:latin typeface="Times New Roman" pitchFamily="18" charset="0"/>
+                <a:cs typeface="Times New Roman" pitchFamily="18" charset="0"/>
+              </a:rPr>
+              <a:t>Виконав: студент групи ПІ-13-2 </a:t>
+            </a:r>
+            <a:br>
+              <a:rPr lang="uk-UA" sz="2000" dirty="0" smtClean="0">
+                <a:latin typeface="Times New Roman" pitchFamily="18" charset="0"/>
+                <a:cs typeface="Times New Roman" pitchFamily="18" charset="0"/>
+              </a:rPr>
+            </a:br>
+            <a:r>
+              <a:rPr lang="uk-UA" sz="2000" dirty="0" err="1" smtClean="0">
+                <a:latin typeface="Times New Roman" pitchFamily="18" charset="0"/>
+                <a:cs typeface="Times New Roman" pitchFamily="18" charset="0"/>
+              </a:rPr>
+              <a:t>Федишин</a:t>
+            </a:r>
+            <a:r>
+              <a:rPr lang="uk-UA" sz="2000" dirty="0" smtClean="0">
+                <a:latin typeface="Times New Roman" pitchFamily="18" charset="0"/>
+                <a:cs typeface="Times New Roman" pitchFamily="18" charset="0"/>
+              </a:rPr>
+              <a:t> А.Г.</a:t>
+            </a:r>
+            <a:endParaRPr lang="uk-UA" sz="2000" dirty="0">
+              <a:latin typeface="Times New Roman" pitchFamily="18" charset="0"/>
+              <a:cs typeface="Times New Roman" pitchFamily="18" charset="0"/>
+            </a:endParaRPr>
+          </a:p>
+        </p:txBody>
+      </p:sp>
+    </p:spTree>
+    <p:extLst>
+      <p:ext uri="{BB962C8B-B14F-4D97-AF65-F5344CB8AC3E}">
+        <p14:creationId xmlns:p14="http://schemas.microsoft.com/office/powerpoint/2010/main" val="3003608115"/>
+      </p:ext>
+    </p:extLst>
+  </p:cSld>
+  <p:clrMapOvr>
+    <a:masterClrMapping/>
+  </p:clrMapOvr>
+  <p:timing>
+    <p:tnLst>
+      <p:par>
+        <p:cTn id="1" dur="indefinite" restart="never" nodeType="tmRoot"/>
+      </p:par>
+    </p:tnLst>
+  </p:timing>
+</p:sld>
+</file>
+
+<file path=ppt/slides/slide2.xml><?xml version="1.0" encoding="utf-8"?>
+<p:sld xmlns:a="http://schemas.openxmlformats.org/drawingml/2006/main" xmlns:r="http://schemas.openxmlformats.org/officeDocument/2006/relationships" xmlns:p="http://schemas.openxmlformats.org/presentationml/2006/main">
+  <p:cSld>
+    <p:spTree>
+      <p:nvGrpSpPr>
+        <p:cNvPr id="1" name=""/>
+        <p:cNvGrpSpPr/>
+        <p:nvPr/>
+      </p:nvGrpSpPr>
+      <p:grpSpPr>
+        <a:xfrm>
+          <a:off x="0" y="0"/>
+          <a:ext cx="0" cy="0"/>
+          <a:chOff x="0" y="0"/>
+          <a:chExt cx="0" cy="0"/>
+        </a:xfrm>
+      </p:grpSpPr>
+      <p:sp>
+        <p:nvSpPr>
+          <p:cNvPr id="6" name="Заголовок 1"/>
+          <p:cNvSpPr>
+            <a:spLocks noGrp="1"/>
+          </p:cNvSpPr>
+          <p:nvPr>
+            <p:ph type="title"/>
+          </p:nvPr>
+        </p:nvSpPr>
+        <p:spPr>
+          <a:xfrm>
+            <a:off x="457200" y="274638"/>
+            <a:ext cx="8229600" cy="1143000"/>
+          </a:xfrm>
+        </p:spPr>
+        <p:txBody>
+          <a:bodyPr/>
+          <a:lstStyle/>
+          <a:p>
+            <a:pPr algn="l"/>
+            <a:r>
+              <a:rPr lang="uk-UA" b="1" dirty="0" smtClean="0">
+                <a:latin typeface="Times New Roman" pitchFamily="18" charset="0"/>
+                <a:cs typeface="Times New Roman" pitchFamily="18" charset="0"/>
+              </a:rPr>
+              <a:t>Мета:</a:t>
+            </a:r>
+            <a:endParaRPr lang="uk-UA" dirty="0">
+              <a:latin typeface="Times New Roman" pitchFamily="18" charset="0"/>
+              <a:cs typeface="Times New Roman" pitchFamily="18" charset="0"/>
+            </a:endParaRPr>
+          </a:p>
+        </p:txBody>
+      </p:sp>
+      <p:sp>
+        <p:nvSpPr>
+          <p:cNvPr id="7" name="Объект 2"/>
+          <p:cNvSpPr>
+            <a:spLocks noGrp="1"/>
+          </p:cNvSpPr>
+          <p:nvPr>
+            <p:ph idx="1"/>
+          </p:nvPr>
+        </p:nvSpPr>
+        <p:spPr>
+          <a:xfrm>
+            <a:off x="467544" y="2492897"/>
+            <a:ext cx="8229600" cy="3456384"/>
+          </a:xfrm>
+        </p:spPr>
+        <p:txBody>
+          <a:bodyPr/>
+          <a:lstStyle/>
+          <a:p>
+            <a:pPr marL="0" indent="0">
+              <a:buNone/>
+            </a:pPr>
+            <a:r>
+              <a:rPr lang="uk-UA" dirty="0" smtClean="0">
+                <a:latin typeface="Times New Roman" pitchFamily="18" charset="0"/>
+                <a:cs typeface="Times New Roman" pitchFamily="18" charset="0"/>
+              </a:rPr>
+              <a:t>Навчитися </a:t>
+            </a:r>
+            <a:r>
+              <a:rPr lang="uk-UA" dirty="0">
+                <a:latin typeface="Times New Roman" pitchFamily="18" charset="0"/>
+                <a:cs typeface="Times New Roman" pitchFamily="18" charset="0"/>
+              </a:rPr>
+              <a:t>створювати </a:t>
+            </a:r>
+            <a:r>
+              <a:rPr lang="en-US" dirty="0">
+                <a:latin typeface="Times New Roman" pitchFamily="18" charset="0"/>
+                <a:cs typeface="Times New Roman" pitchFamily="18" charset="0"/>
+              </a:rPr>
+              <a:t>User Story </a:t>
+            </a:r>
+            <a:r>
+              <a:rPr lang="uk-UA" dirty="0">
+                <a:latin typeface="Times New Roman" pitchFamily="18" charset="0"/>
+                <a:cs typeface="Times New Roman" pitchFamily="18" charset="0"/>
+              </a:rPr>
+              <a:t>та </a:t>
+            </a:r>
+            <a:r>
+              <a:rPr lang="en-US" dirty="0">
+                <a:latin typeface="Times New Roman" pitchFamily="18" charset="0"/>
+                <a:cs typeface="Times New Roman" pitchFamily="18" charset="0"/>
+              </a:rPr>
+              <a:t>Tasks</a:t>
+            </a:r>
+            <a:r>
+              <a:rPr lang="uk-UA" dirty="0">
+                <a:latin typeface="Times New Roman" pitchFamily="18" charset="0"/>
+                <a:cs typeface="Times New Roman" pitchFamily="18" charset="0"/>
+              </a:rPr>
+              <a:t> вже готового продукту</a:t>
+            </a:r>
+            <a:endParaRPr lang="uk-UA" dirty="0" smtClean="0">
+              <a:latin typeface="Times New Roman" pitchFamily="18" charset="0"/>
+              <a:cs typeface="Times New Roman" pitchFamily="18" charset="0"/>
+            </a:endParaRPr>
+          </a:p>
+        </p:txBody>
+      </p:sp>
+    </p:spTree>
+    <p:extLst>
+      <p:ext uri="{BB962C8B-B14F-4D97-AF65-F5344CB8AC3E}">
+        <p14:creationId xmlns:p14="http://schemas.microsoft.com/office/powerpoint/2010/main" val="758631622"/>
+      </p:ext>
+    </p:extLst>
+  </p:cSld>
+  <p:clrMapOvr>
+    <a:masterClrMapping/>
+  </p:clrMapOvr>
+  <p:timing>
+    <p:tnLst>
+      <p:par>
+        <p:cTn id="1" dur="indefinite" restart="never" nodeType="tmRoot"/>
+      </p:par>
+    </p:tnLst>
+  </p:timing>
+</p:sld>
+</file>
+
+<file path=ppt/slides/slide3.xml><?xml version="1.0" encoding="utf-8"?>
+<p:sld xmlns:a="http://schemas.openxmlformats.org/drawingml/2006/main" xmlns:r="http://schemas.openxmlformats.org/officeDocument/2006/relationships" xmlns:p="http://schemas.openxmlformats.org/presentationml/2006/main">
+  <p:cSld>
+    <p:spTree>
+      <p:nvGrpSpPr>
+        <p:cNvPr id="1" name=""/>
+        <p:cNvGrpSpPr/>
+        <p:nvPr/>
+      </p:nvGrpSpPr>
+      <p:grpSpPr>
+        <a:xfrm>
+          <a:off x="0" y="0"/>
+          <a:ext cx="0" cy="0"/>
+          <a:chOff x="0" y="0"/>
+          <a:chExt cx="0" cy="0"/>
+        </a:xfrm>
+      </p:grpSpPr>
+      <p:sp>
+        <p:nvSpPr>
+          <p:cNvPr id="8" name="Заголовок 7"/>
+          <p:cNvSpPr>
+            <a:spLocks noGrp="1"/>
+          </p:cNvSpPr>
+          <p:nvPr>
+            <p:ph type="title"/>
+          </p:nvPr>
+        </p:nvSpPr>
+        <p:spPr/>
+        <p:txBody>
+          <a:bodyPr/>
+          <a:lstStyle/>
+          <a:p>
+            <a:pPr algn="l"/>
+            <a:r>
+              <a:rPr lang="uk-UA" dirty="0" smtClean="0">
+                <a:latin typeface="Times New Roman" pitchFamily="18" charset="0"/>
+                <a:cs typeface="Times New Roman" pitchFamily="18" charset="0"/>
+              </a:rPr>
+              <a:t>Виконання завдання</a:t>
+            </a:r>
+            <a:endParaRPr lang="uk-UA" dirty="0">
+              <a:latin typeface="Times New Roman" pitchFamily="18" charset="0"/>
+              <a:cs typeface="Times New Roman" pitchFamily="18" charset="0"/>
+            </a:endParaRPr>
+          </a:p>
+        </p:txBody>
+      </p:sp>
+      <p:sp>
+        <p:nvSpPr>
+          <p:cNvPr id="9" name="Прямоугольник 8"/>
+          <p:cNvSpPr/>
+          <p:nvPr/>
+        </p:nvSpPr>
+        <p:spPr>
+          <a:xfrm>
+            <a:off x="6300192" y="6309320"/>
+            <a:ext cx="2622000" cy="369332"/>
+          </a:xfrm>
+          <a:prstGeom prst="rect">
+            <a:avLst/>
+          </a:prstGeom>
+        </p:spPr>
+        <p:txBody>
+          <a:bodyPr wrap="none">
+            <a:spAutoFit/>
+          </a:bodyPr>
+          <a:lstStyle/>
+          <a:p>
+            <a:r>
+              <a:rPr lang="uk-UA" b="1" dirty="0" err="1"/>
+              <a:t>Мокап</a:t>
+            </a:r>
+            <a:r>
+              <a:rPr lang="uk-UA" b="1" dirty="0"/>
+              <a:t> сайту </a:t>
+            </a:r>
+            <a:r>
+              <a:rPr lang="en-US" b="1" dirty="0" err="1"/>
+              <a:t>pisni</a:t>
+            </a:r>
+            <a:r>
+              <a:rPr lang="uk-UA" b="1" dirty="0"/>
+              <a:t>.</a:t>
+            </a:r>
+            <a:r>
+              <a:rPr lang="en-US" b="1" dirty="0"/>
+              <a:t>org</a:t>
+            </a:r>
+            <a:r>
+              <a:rPr lang="uk-UA" b="1" dirty="0"/>
+              <a:t>.</a:t>
+            </a:r>
+            <a:r>
+              <a:rPr lang="en-US" b="1" dirty="0" err="1"/>
+              <a:t>ua</a:t>
+            </a:r>
+            <a:endParaRPr lang="uk-UA" dirty="0"/>
+          </a:p>
+        </p:txBody>
+      </p:sp>
+      <p:pic>
+        <p:nvPicPr>
+          <p:cNvPr id="1026" name="Picture 2" descr="C:\Users\Andre\Desktop\6 Семестр\Андрій\Якість програмного забезпечення та тестування\Лаби\Лаб 3\Мокап.jpg"/>
+          <p:cNvPicPr>
+            <a:picLocks noChangeAspect="1" noChangeArrowheads="1"/>
+          </p:cNvPicPr>
+          <p:nvPr/>
+        </p:nvPicPr>
+        <p:blipFill>
+          <a:blip r:embed="rId2">
+            <a:extLst>
+              <a:ext uri="{28A0092B-C50C-407E-A947-70E740481C1C}">
+                <a14:useLocalDpi xmlns:a14="http://schemas.microsoft.com/office/drawing/2010/main" val="0"/>
+              </a:ext>
+            </a:extLst>
+          </a:blip>
+          <a:srcRect/>
+          <a:stretch>
+            <a:fillRect/>
+          </a:stretch>
+        </p:blipFill>
+        <p:spPr bwMode="auto">
+          <a:xfrm>
+            <a:off x="539552" y="1484784"/>
+            <a:ext cx="8224193" cy="4493267"/>
+          </a:xfrm>
+          <a:prstGeom prst="rect">
+            <a:avLst/>
+          </a:prstGeom>
+          <a:noFill/>
+          <a:extLst>
+            <a:ext uri="{909E8E84-426E-40DD-AFC4-6F175D3DCCD1}">
+              <a14:hiddenFill xmlns:a14="http://schemas.microsoft.com/office/drawing/2010/main">
+                <a:solidFill>
+                  <a:srgbClr val="FFFFFF"/>
+                </a:solidFill>
+              </a14:hiddenFill>
+            </a:ext>
+          </a:extLst>
+        </p:spPr>
+      </p:pic>
+    </p:spTree>
+    <p:extLst>
+      <p:ext uri="{BB962C8B-B14F-4D97-AF65-F5344CB8AC3E}">
+        <p14:creationId xmlns:p14="http://schemas.microsoft.com/office/powerpoint/2010/main" val="2510063367"/>
+      </p:ext>
+    </p:extLst>
+  </p:cSld>
+  <p:clrMapOvr>
+    <a:masterClrMapping/>
+  </p:clrMapOvr>
+  <p:timing>
+    <p:tnLst>
+      <p:par>
+        <p:cTn id="1" dur="indefinite" restart="never" nodeType="tmRoot"/>
+      </p:par>
+    </p:tnLst>
+  </p:timing>
+</p:sld>
+</file>
+
+<file path=ppt/slides/slide4.xml><?xml version="1.0" encoding="utf-8"?>
+<p:sld xmlns:a="http://schemas.openxmlformats.org/drawingml/2006/main" xmlns:r="http://schemas.openxmlformats.org/officeDocument/2006/relationships" xmlns:p="http://schemas.openxmlformats.org/presentationml/2006/main">
+  <p:cSld>
+    <p:spTree>
+      <p:nvGrpSpPr>
+        <p:cNvPr id="1" name=""/>
+        <p:cNvGrpSpPr/>
+        <p:nvPr/>
+      </p:nvGrpSpPr>
+      <p:grpSpPr>
+        <a:xfrm>
+          <a:off x="0" y="0"/>
+          <a:ext cx="0" cy="0"/>
+          <a:chOff x="0" y="0"/>
+          <a:chExt cx="0" cy="0"/>
+        </a:xfrm>
+      </p:grpSpPr>
+      <p:sp>
+        <p:nvSpPr>
+          <p:cNvPr id="2" name="Заголовок 1"/>
+          <p:cNvSpPr>
+            <a:spLocks noGrp="1"/>
+          </p:cNvSpPr>
+          <p:nvPr>
+            <p:ph type="title"/>
+          </p:nvPr>
+        </p:nvSpPr>
+        <p:spPr/>
+        <p:txBody>
+          <a:bodyPr/>
+          <a:lstStyle/>
+          <a:p>
+            <a:pPr algn="l"/>
+            <a:r>
+              <a:rPr lang="en-US" dirty="0" smtClean="0">
+                <a:latin typeface="Times New Roman" pitchFamily="18" charset="0"/>
+                <a:cs typeface="Times New Roman" pitchFamily="18" charset="0"/>
+              </a:rPr>
+              <a:t>Tasks</a:t>
+            </a:r>
+            <a:endParaRPr lang="uk-UA" dirty="0">
+              <a:latin typeface="Times New Roman" pitchFamily="18" charset="0"/>
+              <a:cs typeface="Times New Roman" pitchFamily="18" charset="0"/>
+            </a:endParaRPr>
+          </a:p>
+        </p:txBody>
+      </p:sp>
+      <p:sp>
+        <p:nvSpPr>
+          <p:cNvPr id="3" name="Объект 2"/>
+          <p:cNvSpPr>
+            <a:spLocks noGrp="1"/>
+          </p:cNvSpPr>
+          <p:nvPr>
+            <p:ph idx="1"/>
+          </p:nvPr>
+        </p:nvSpPr>
+        <p:spPr/>
+        <p:txBody>
+          <a:bodyPr>
+            <a:normAutofit fontScale="77500" lnSpcReduction="20000"/>
+          </a:bodyPr>
+          <a:lstStyle/>
+          <a:p>
+            <a:pPr lvl="0" algn="just"/>
+            <a:r>
+              <a:rPr lang="uk-UA" dirty="0"/>
+              <a:t>Створити панель навігації по сайту</a:t>
+            </a:r>
+            <a:r>
+              <a:rPr lang="ru-RU" dirty="0"/>
+              <a:t>;</a:t>
+            </a:r>
+            <a:endParaRPr lang="uk-UA" dirty="0"/>
+          </a:p>
+          <a:p>
+            <a:pPr lvl="0" algn="just"/>
+            <a:r>
+              <a:rPr lang="uk-UA" dirty="0"/>
+              <a:t>Створити панель пошуку виконавця по першому символу назви</a:t>
+            </a:r>
+            <a:r>
+              <a:rPr lang="ru-RU" dirty="0"/>
+              <a:t>;</a:t>
+            </a:r>
+            <a:endParaRPr lang="uk-UA" dirty="0"/>
+          </a:p>
+          <a:p>
+            <a:pPr lvl="0" algn="just"/>
+            <a:r>
+              <a:rPr lang="ru-RU" dirty="0" err="1"/>
+              <a:t>Реалізувати</a:t>
+            </a:r>
+            <a:r>
+              <a:rPr lang="ru-RU" dirty="0"/>
+              <a:t> </a:t>
+            </a:r>
+            <a:r>
+              <a:rPr lang="ru-RU" dirty="0" err="1"/>
+              <a:t>можливість</a:t>
+            </a:r>
+            <a:r>
+              <a:rPr lang="ru-RU" dirty="0"/>
+              <a:t> </a:t>
+            </a:r>
+            <a:r>
+              <a:rPr lang="ru-RU" dirty="0" err="1"/>
+              <a:t>пошуку</a:t>
+            </a:r>
+            <a:r>
+              <a:rPr lang="ru-RU" dirty="0"/>
+              <a:t> </a:t>
+            </a:r>
+            <a:r>
+              <a:rPr lang="ru-RU" dirty="0" err="1"/>
+              <a:t>пісні</a:t>
+            </a:r>
+            <a:r>
+              <a:rPr lang="ru-RU" dirty="0"/>
+              <a:t> по фрагменту тексту;</a:t>
+            </a:r>
+            <a:endParaRPr lang="uk-UA" dirty="0"/>
+          </a:p>
+          <a:p>
+            <a:pPr lvl="0" algn="just"/>
+            <a:r>
+              <a:rPr lang="ru-RU" dirty="0" err="1"/>
+              <a:t>Створити</a:t>
+            </a:r>
+            <a:r>
+              <a:rPr lang="ru-RU" dirty="0"/>
+              <a:t> панель </a:t>
+            </a:r>
+            <a:r>
+              <a:rPr lang="ru-RU" dirty="0" err="1"/>
+              <a:t>навігації</a:t>
+            </a:r>
+            <a:r>
+              <a:rPr lang="ru-RU" dirty="0"/>
+              <a:t> по </a:t>
+            </a:r>
+            <a:r>
+              <a:rPr lang="ru-RU" dirty="0" err="1"/>
+              <a:t>останніх</a:t>
+            </a:r>
+            <a:r>
+              <a:rPr lang="ru-RU" dirty="0"/>
+              <a:t> </a:t>
+            </a:r>
+            <a:r>
+              <a:rPr lang="ru-RU" dirty="0" err="1"/>
+              <a:t>обговорюваних</a:t>
+            </a:r>
+            <a:r>
+              <a:rPr lang="ru-RU" dirty="0"/>
+              <a:t> формах;</a:t>
+            </a:r>
+            <a:endParaRPr lang="uk-UA" dirty="0"/>
+          </a:p>
+          <a:p>
+            <a:pPr lvl="0" algn="just"/>
+            <a:r>
+              <a:rPr lang="ru-RU" dirty="0" err="1"/>
+              <a:t>Розмістити</a:t>
+            </a:r>
+            <a:r>
+              <a:rPr lang="ru-RU" dirty="0"/>
+              <a:t> два </a:t>
+            </a:r>
+            <a:r>
+              <a:rPr lang="ru-RU" dirty="0" err="1"/>
+              <a:t>рекламні</a:t>
+            </a:r>
+            <a:r>
+              <a:rPr lang="ru-RU" dirty="0"/>
+              <a:t> </a:t>
+            </a:r>
+            <a:r>
+              <a:rPr lang="ru-RU" dirty="0" err="1"/>
+              <a:t>банери</a:t>
+            </a:r>
+            <a:r>
+              <a:rPr lang="en-US" dirty="0"/>
+              <a:t>;</a:t>
+            </a:r>
+            <a:endParaRPr lang="uk-UA" dirty="0"/>
+          </a:p>
+          <a:p>
+            <a:pPr lvl="0" algn="just"/>
+            <a:r>
+              <a:rPr lang="ru-RU" dirty="0" err="1"/>
+              <a:t>Реалізувати</a:t>
+            </a:r>
+            <a:r>
+              <a:rPr lang="ru-RU" dirty="0"/>
+              <a:t> </a:t>
+            </a:r>
+            <a:r>
+              <a:rPr lang="ru-RU" dirty="0" err="1"/>
+              <a:t>можливість</a:t>
+            </a:r>
+            <a:r>
+              <a:rPr lang="ru-RU" dirty="0"/>
+              <a:t> перегляду </a:t>
+            </a:r>
+            <a:r>
+              <a:rPr lang="ru-RU" dirty="0" err="1"/>
+              <a:t>відео</a:t>
+            </a:r>
+            <a:r>
+              <a:rPr lang="ru-RU" dirty="0"/>
+              <a:t> з рекламного </a:t>
+            </a:r>
+            <a:r>
+              <a:rPr lang="ru-RU" dirty="0" err="1"/>
+              <a:t>банера</a:t>
+            </a:r>
+            <a:r>
+              <a:rPr lang="ru-RU" dirty="0"/>
+              <a:t>;</a:t>
+            </a:r>
+            <a:endParaRPr lang="uk-UA" dirty="0"/>
+          </a:p>
+          <a:p>
+            <a:pPr lvl="0" algn="just"/>
+            <a:r>
+              <a:rPr lang="ru-RU" dirty="0" err="1"/>
+              <a:t>Створити</a:t>
+            </a:r>
+            <a:r>
+              <a:rPr lang="ru-RU" dirty="0"/>
+              <a:t> панель входу/</a:t>
+            </a:r>
+            <a:r>
+              <a:rPr lang="ru-RU" dirty="0" err="1"/>
+              <a:t>реєстрації</a:t>
+            </a:r>
+            <a:r>
+              <a:rPr lang="ru-RU" dirty="0"/>
+              <a:t> на сайт;</a:t>
+            </a:r>
+            <a:endParaRPr lang="uk-UA" dirty="0"/>
+          </a:p>
+          <a:p>
+            <a:pPr lvl="0" algn="just"/>
+            <a:r>
+              <a:rPr lang="ru-RU" dirty="0" err="1"/>
+              <a:t>Створити</a:t>
+            </a:r>
+            <a:r>
+              <a:rPr lang="ru-RU" dirty="0"/>
+              <a:t> панель з </a:t>
+            </a:r>
+            <a:r>
+              <a:rPr lang="ru-RU" dirty="0" err="1"/>
+              <a:t>останніми</a:t>
+            </a:r>
+            <a:r>
+              <a:rPr lang="ru-RU" dirty="0"/>
+              <a:t> </a:t>
+            </a:r>
+            <a:r>
+              <a:rPr lang="ru-RU" dirty="0" err="1"/>
+              <a:t>доданими</a:t>
+            </a:r>
+            <a:r>
+              <a:rPr lang="ru-RU" dirty="0"/>
+              <a:t> на сайт </a:t>
+            </a:r>
+            <a:r>
+              <a:rPr lang="ru-RU" dirty="0" err="1"/>
+              <a:t>піснями</a:t>
+            </a:r>
+            <a:r>
+              <a:rPr lang="ru-RU" dirty="0"/>
+              <a:t>;</a:t>
+            </a:r>
+            <a:endParaRPr lang="uk-UA" dirty="0"/>
+          </a:p>
+        </p:txBody>
+      </p:sp>
+    </p:spTree>
+    <p:extLst>
+      <p:ext uri="{BB962C8B-B14F-4D97-AF65-F5344CB8AC3E}">
+        <p14:creationId xmlns:p14="http://schemas.microsoft.com/office/powerpoint/2010/main" val="2510063367"/>
+      </p:ext>
+    </p:extLst>
+  </p:cSld>
+  <p:clrMapOvr>
+    <a:masterClrMapping/>
+  </p:clrMapOvr>
+  <p:timing>
+    <p:tnLst>
+      <p:par>
+        <p:cTn id="1" dur="indefinite" restart="never" nodeType="tmRoot"/>
+      </p:par>
+    </p:tnLst>
+  </p:timing>
+</p:sld>
+</file>
+
+<file path=ppt/slides/slide5.xml><?xml version="1.0" encoding="utf-8"?>
+<p:sld xmlns:a="http://schemas.openxmlformats.org/drawingml/2006/main" xmlns:r="http://schemas.openxmlformats.org/officeDocument/2006/relationships" xmlns:p="http://schemas.openxmlformats.org/presentationml/2006/main">
+  <p:cSld>
+    <p:spTree>
+      <p:nvGrpSpPr>
+        <p:cNvPr id="1" name=""/>
+        <p:cNvGrpSpPr/>
+        <p:nvPr/>
+      </p:nvGrpSpPr>
+      <p:grpSpPr>
+        <a:xfrm>
+          <a:off x="0" y="0"/>
+          <a:ext cx="0" cy="0"/>
+          <a:chOff x="0" y="0"/>
+          <a:chExt cx="0" cy="0"/>
+        </a:xfrm>
+      </p:grpSpPr>
+      <p:sp>
+        <p:nvSpPr>
+          <p:cNvPr id="4" name="Заголовок 1"/>
+          <p:cNvSpPr>
+            <a:spLocks noGrp="1"/>
+          </p:cNvSpPr>
+          <p:nvPr>
+            <p:ph type="title"/>
+          </p:nvPr>
+        </p:nvSpPr>
+        <p:spPr>
+          <a:xfrm>
+            <a:off x="457200" y="274638"/>
+            <a:ext cx="8229600" cy="1143000"/>
+          </a:xfrm>
+        </p:spPr>
+        <p:txBody>
+          <a:bodyPr/>
+          <a:lstStyle/>
+          <a:p>
+            <a:pPr algn="l"/>
+            <a:r>
+              <a:rPr lang="en-US" dirty="0" smtClean="0">
+                <a:latin typeface="Times New Roman" pitchFamily="18" charset="0"/>
+                <a:cs typeface="Times New Roman" pitchFamily="18" charset="0"/>
+              </a:rPr>
+              <a:t>Tasks</a:t>
+            </a:r>
+            <a:endParaRPr lang="uk-UA" dirty="0">
+              <a:latin typeface="Times New Roman" pitchFamily="18" charset="0"/>
+              <a:cs typeface="Times New Roman" pitchFamily="18" charset="0"/>
+            </a:endParaRPr>
+          </a:p>
+        </p:txBody>
+      </p:sp>
+      <p:sp>
+        <p:nvSpPr>
+          <p:cNvPr id="5" name="Объект 2"/>
+          <p:cNvSpPr>
+            <a:spLocks noGrp="1"/>
+          </p:cNvSpPr>
+          <p:nvPr>
+            <p:ph idx="1"/>
+          </p:nvPr>
+        </p:nvSpPr>
+        <p:spPr>
+          <a:xfrm>
+            <a:off x="457200" y="1600200"/>
+            <a:ext cx="8229600" cy="4525963"/>
+          </a:xfrm>
+        </p:spPr>
+        <p:txBody>
+          <a:bodyPr>
+            <a:normAutofit fontScale="85000" lnSpcReduction="20000"/>
+          </a:bodyPr>
+          <a:lstStyle/>
+          <a:p>
+            <a:pPr lvl="0" algn="just"/>
+            <a:r>
+              <a:rPr lang="ru-RU" dirty="0" err="1"/>
+              <a:t>Реалізувати</a:t>
+            </a:r>
+            <a:r>
+              <a:rPr lang="ru-RU" dirty="0"/>
+              <a:t> </a:t>
+            </a:r>
+            <a:r>
+              <a:rPr lang="ru-RU" dirty="0" err="1"/>
+              <a:t>можливість</a:t>
+            </a:r>
+            <a:r>
+              <a:rPr lang="ru-RU" dirty="0"/>
+              <a:t> плавного переходу </a:t>
+            </a:r>
+            <a:r>
+              <a:rPr lang="ru-RU" dirty="0" err="1"/>
+              <a:t>між</a:t>
+            </a:r>
+            <a:r>
+              <a:rPr lang="ru-RU" dirty="0"/>
+              <a:t> вкладками на </a:t>
+            </a:r>
+            <a:r>
+              <a:rPr lang="ru-RU" dirty="0" err="1"/>
+              <a:t>панелі</a:t>
+            </a:r>
+            <a:r>
+              <a:rPr lang="ru-RU" dirty="0"/>
+              <a:t> </a:t>
+            </a:r>
+            <a:r>
+              <a:rPr lang="ru-RU" dirty="0" err="1"/>
+              <a:t>навігації</a:t>
+            </a:r>
+            <a:r>
+              <a:rPr lang="ru-RU" dirty="0"/>
+              <a:t>;</a:t>
+            </a:r>
+            <a:endParaRPr lang="uk-UA" dirty="0"/>
+          </a:p>
+          <a:p>
+            <a:pPr lvl="0" algn="just"/>
+            <a:r>
+              <a:rPr lang="ru-RU" dirty="0" err="1"/>
+              <a:t>Реалізувати</a:t>
+            </a:r>
+            <a:r>
+              <a:rPr lang="ru-RU" dirty="0"/>
+              <a:t> </a:t>
+            </a:r>
+            <a:r>
+              <a:rPr lang="ru-RU" dirty="0" err="1"/>
+              <a:t>можливість</a:t>
+            </a:r>
+            <a:r>
+              <a:rPr lang="ru-RU" dirty="0"/>
+              <a:t> перегляду </a:t>
+            </a:r>
+            <a:r>
+              <a:rPr lang="ru-RU" dirty="0" err="1"/>
+              <a:t>відео</a:t>
+            </a:r>
+            <a:r>
+              <a:rPr lang="ru-RU" dirty="0"/>
+              <a:t> </a:t>
+            </a:r>
+            <a:r>
+              <a:rPr lang="ru-RU" dirty="0" err="1"/>
+              <a:t>зі</a:t>
+            </a:r>
+            <a:r>
+              <a:rPr lang="ru-RU" dirty="0"/>
+              <a:t> списку з </a:t>
+            </a:r>
+            <a:r>
+              <a:rPr lang="ru-RU" dirty="0" err="1"/>
+              <a:t>останніми</a:t>
+            </a:r>
+            <a:r>
+              <a:rPr lang="ru-RU" dirty="0"/>
+              <a:t> </a:t>
+            </a:r>
+            <a:r>
+              <a:rPr lang="ru-RU" dirty="0" err="1"/>
+              <a:t>доданими</a:t>
+            </a:r>
+            <a:r>
+              <a:rPr lang="ru-RU" dirty="0"/>
+              <a:t> </a:t>
+            </a:r>
+            <a:r>
+              <a:rPr lang="ru-RU" dirty="0" err="1"/>
+              <a:t>піснями</a:t>
+            </a:r>
+            <a:r>
+              <a:rPr lang="ru-RU" dirty="0"/>
+              <a:t>;</a:t>
+            </a:r>
+            <a:endParaRPr lang="uk-UA" dirty="0"/>
+          </a:p>
+          <a:p>
+            <a:pPr lvl="0" algn="just"/>
+            <a:r>
+              <a:rPr lang="ru-RU" dirty="0" err="1"/>
+              <a:t>Створити</a:t>
+            </a:r>
+            <a:r>
+              <a:rPr lang="ru-RU" dirty="0"/>
+              <a:t> </a:t>
+            </a:r>
+            <a:r>
+              <a:rPr lang="ru-RU" dirty="0" err="1"/>
+              <a:t>повнофункціональний</a:t>
+            </a:r>
+            <a:r>
+              <a:rPr lang="ru-RU" dirty="0"/>
+              <a:t> модуль для </a:t>
+            </a:r>
+            <a:r>
+              <a:rPr lang="ru-RU" dirty="0" err="1"/>
+              <a:t>взаємодії</a:t>
+            </a:r>
+            <a:r>
+              <a:rPr lang="ru-RU" dirty="0"/>
+              <a:t> з контентом сайту з </a:t>
+            </a:r>
+            <a:r>
+              <a:rPr lang="ru-RU" dirty="0" err="1"/>
+              <a:t>мобільного</a:t>
+            </a:r>
+            <a:r>
+              <a:rPr lang="ru-RU" dirty="0"/>
+              <a:t> пристрою;</a:t>
+            </a:r>
+            <a:endParaRPr lang="uk-UA" dirty="0"/>
+          </a:p>
+          <a:p>
+            <a:pPr lvl="0" algn="just"/>
+            <a:r>
+              <a:rPr lang="ru-RU" dirty="0" err="1"/>
+              <a:t>Створити</a:t>
+            </a:r>
+            <a:r>
+              <a:rPr lang="ru-RU" dirty="0"/>
+              <a:t> </a:t>
+            </a:r>
+            <a:r>
+              <a:rPr lang="ru-RU" dirty="0" err="1"/>
+              <a:t>можливість</a:t>
+            </a:r>
+            <a:r>
+              <a:rPr lang="ru-RU" dirty="0"/>
+              <a:t> </a:t>
+            </a:r>
+            <a:r>
+              <a:rPr lang="ru-RU" dirty="0" err="1"/>
+              <a:t>пошуку</a:t>
+            </a:r>
+            <a:r>
+              <a:rPr lang="ru-RU" dirty="0"/>
+              <a:t> </a:t>
+            </a:r>
+            <a:r>
+              <a:rPr lang="ru-RU" dirty="0" err="1"/>
+              <a:t>пісні</a:t>
+            </a:r>
+            <a:r>
+              <a:rPr lang="ru-RU" dirty="0"/>
+              <a:t> по сайту за датою </a:t>
+            </a:r>
+            <a:r>
+              <a:rPr lang="ru-RU" dirty="0" err="1"/>
+              <a:t>додавання</a:t>
+            </a:r>
+            <a:r>
+              <a:rPr lang="ru-RU" dirty="0"/>
+              <a:t>;</a:t>
+            </a:r>
+            <a:endParaRPr lang="uk-UA" dirty="0"/>
+          </a:p>
+          <a:p>
+            <a:pPr lvl="0" algn="just"/>
+            <a:r>
+              <a:rPr lang="ru-RU" dirty="0" err="1"/>
+              <a:t>Створити</a:t>
+            </a:r>
+            <a:r>
+              <a:rPr lang="ru-RU" dirty="0"/>
+              <a:t> модуль </a:t>
+            </a:r>
+            <a:r>
+              <a:rPr lang="ru-RU" dirty="0" err="1"/>
+              <a:t>реєстрації</a:t>
+            </a:r>
+            <a:r>
+              <a:rPr lang="ru-RU" dirty="0"/>
+              <a:t> на </a:t>
+            </a:r>
+            <a:r>
+              <a:rPr lang="ru-RU" dirty="0" err="1"/>
+              <a:t>сайті</a:t>
+            </a:r>
+            <a:r>
+              <a:rPr lang="ru-RU" dirty="0"/>
+              <a:t> з </a:t>
+            </a:r>
+            <a:r>
+              <a:rPr lang="ru-RU" dirty="0" err="1"/>
+              <a:t>підтвердженням</a:t>
+            </a:r>
+            <a:r>
+              <a:rPr lang="ru-RU" dirty="0"/>
+              <a:t> через </a:t>
+            </a:r>
+            <a:r>
+              <a:rPr lang="ru-RU" dirty="0" err="1"/>
+              <a:t>електронну</a:t>
+            </a:r>
+            <a:r>
+              <a:rPr lang="ru-RU" dirty="0"/>
+              <a:t> </a:t>
+            </a:r>
+            <a:r>
+              <a:rPr lang="ru-RU" dirty="0" err="1"/>
+              <a:t>пошту</a:t>
+            </a:r>
+            <a:r>
+              <a:rPr lang="ru-RU" dirty="0"/>
+              <a:t>;</a:t>
+            </a:r>
+            <a:endParaRPr lang="uk-UA" dirty="0"/>
+          </a:p>
+          <a:p>
+            <a:pPr lvl="0" algn="just"/>
+            <a:r>
+              <a:rPr lang="ru-RU" dirty="0" err="1"/>
+              <a:t>Реалізувати</a:t>
+            </a:r>
+            <a:r>
+              <a:rPr lang="ru-RU" dirty="0"/>
+              <a:t> </a:t>
+            </a:r>
+            <a:r>
+              <a:rPr lang="ru-RU" dirty="0" err="1"/>
+              <a:t>можливість</a:t>
+            </a:r>
+            <a:r>
+              <a:rPr lang="ru-RU" dirty="0"/>
+              <a:t> </a:t>
+            </a:r>
+            <a:r>
+              <a:rPr lang="ru-RU" dirty="0" err="1"/>
+              <a:t>попереднього</a:t>
+            </a:r>
+            <a:r>
+              <a:rPr lang="ru-RU" dirty="0"/>
+              <a:t> перегляду </a:t>
+            </a:r>
+            <a:r>
+              <a:rPr lang="ru-RU" dirty="0" err="1"/>
+              <a:t>пісні</a:t>
+            </a:r>
+            <a:r>
+              <a:rPr lang="ru-RU" dirty="0"/>
+              <a:t> у </a:t>
+            </a:r>
+            <a:r>
+              <a:rPr lang="ru-RU" dirty="0" err="1"/>
+              <a:t>вигляді</a:t>
+            </a:r>
+            <a:r>
+              <a:rPr lang="ru-RU" dirty="0"/>
+              <a:t> </a:t>
+            </a:r>
+            <a:r>
+              <a:rPr lang="ru-RU" dirty="0" err="1"/>
+              <a:t>спливаючого</a:t>
+            </a:r>
+            <a:r>
+              <a:rPr lang="ru-RU" dirty="0"/>
+              <a:t> </a:t>
+            </a:r>
+            <a:r>
+              <a:rPr lang="ru-RU" dirty="0" err="1"/>
+              <a:t>вікна</a:t>
+            </a:r>
+            <a:r>
+              <a:rPr lang="ru-RU" dirty="0"/>
+              <a:t>.</a:t>
+            </a:r>
+            <a:endParaRPr lang="uk-UA" dirty="0"/>
+          </a:p>
+        </p:txBody>
+      </p:sp>
+    </p:spTree>
+    <p:extLst>
+      <p:ext uri="{BB962C8B-B14F-4D97-AF65-F5344CB8AC3E}">
+        <p14:creationId xmlns:p14="http://schemas.microsoft.com/office/powerpoint/2010/main" val="1214918277"/>
+      </p:ext>
+    </p:extLst>
+  </p:cSld>
+  <p:clrMapOvr>
+    <a:masterClrMapping/>
+  </p:clrMapOvr>
+  <p:timing>
+    <p:tnLst>
+      <p:par>
+        <p:cTn id="1" dur="indefinite" restart="never" nodeType="tmRoot"/>
+      </p:par>
+    </p:tnLst>
+  </p:timing>
+</p:sld>
+</file>
+
+<file path=ppt/slides/slide6.xml><?xml version="1.0" encoding="utf-8"?>
+<p:sld xmlns:a="http://schemas.openxmlformats.org/drawingml/2006/main" xmlns:r="http://schemas.openxmlformats.org/officeDocument/2006/relationships" xmlns:p="http://schemas.openxmlformats.org/presentationml/2006/main">
+  <p:cSld>
+    <p:spTree>
+      <p:nvGrpSpPr>
+        <p:cNvPr id="1" name=""/>
+        <p:cNvGrpSpPr/>
+        <p:nvPr/>
+      </p:nvGrpSpPr>
+      <p:grpSpPr>
+        <a:xfrm>
+          <a:off x="0" y="0"/>
+          <a:ext cx="0" cy="0"/>
+          <a:chOff x="0" y="0"/>
+          <a:chExt cx="0" cy="0"/>
+        </a:xfrm>
+      </p:grpSpPr>
+      <p:sp>
+        <p:nvSpPr>
+          <p:cNvPr id="6" name="Заголовок 1"/>
+          <p:cNvSpPr>
+            <a:spLocks noGrp="1"/>
+          </p:cNvSpPr>
+          <p:nvPr>
+            <p:ph type="title"/>
+          </p:nvPr>
+        </p:nvSpPr>
+        <p:spPr>
+          <a:xfrm>
+            <a:off x="457200" y="274638"/>
+            <a:ext cx="8229600" cy="1143000"/>
+          </a:xfrm>
+        </p:spPr>
+        <p:txBody>
+          <a:bodyPr/>
+          <a:lstStyle/>
+          <a:p>
+            <a:pPr algn="l"/>
+            <a:r>
+              <a:rPr lang="uk-UA" dirty="0" smtClean="0">
+                <a:latin typeface="Times New Roman" pitchFamily="18" charset="0"/>
+                <a:cs typeface="Times New Roman" pitchFamily="18" charset="0"/>
+              </a:rPr>
+              <a:t>Висновки:</a:t>
+            </a:r>
+            <a:endParaRPr lang="uk-UA" dirty="0">
+              <a:latin typeface="Times New Roman" pitchFamily="18" charset="0"/>
+              <a:cs typeface="Times New Roman" pitchFamily="18" charset="0"/>
+            </a:endParaRPr>
+          </a:p>
+        </p:txBody>
+      </p:sp>
+      <p:sp>
+        <p:nvSpPr>
+          <p:cNvPr id="7" name="Объект 2"/>
+          <p:cNvSpPr>
+            <a:spLocks noGrp="1"/>
+          </p:cNvSpPr>
+          <p:nvPr>
+            <p:ph idx="1"/>
+          </p:nvPr>
+        </p:nvSpPr>
+        <p:spPr>
+          <a:xfrm>
+            <a:off x="457200" y="1600200"/>
+            <a:ext cx="8229600" cy="4525963"/>
+          </a:xfrm>
+        </p:spPr>
+        <p:txBody>
+          <a:bodyPr/>
+          <a:lstStyle/>
+          <a:p>
+            <a:pPr marL="0" indent="0">
+              <a:buNone/>
+            </a:pPr>
+            <a:r>
+              <a:rPr lang="uk-UA" dirty="0">
+                <a:latin typeface="Times New Roman" pitchFamily="18" charset="0"/>
+                <a:cs typeface="Times New Roman" pitchFamily="18" charset="0"/>
+              </a:rPr>
+              <a:t>на даній лабораторній роботі я створив </a:t>
+            </a:r>
+            <a:r>
+              <a:rPr lang="uk-UA" dirty="0" err="1">
+                <a:latin typeface="Times New Roman" pitchFamily="18" charset="0"/>
+                <a:cs typeface="Times New Roman" pitchFamily="18" charset="0"/>
+              </a:rPr>
+              <a:t>мокап</a:t>
+            </a:r>
+            <a:r>
+              <a:rPr lang="uk-UA" dirty="0">
+                <a:latin typeface="Times New Roman" pitchFamily="18" charset="0"/>
+                <a:cs typeface="Times New Roman" pitchFamily="18" charset="0"/>
+              </a:rPr>
+              <a:t> сайт</a:t>
+            </a:r>
+            <a:r>
+              <a:rPr lang="en-US" dirty="0">
+                <a:latin typeface="Times New Roman" pitchFamily="18" charset="0"/>
+                <a:cs typeface="Times New Roman" pitchFamily="18" charset="0"/>
+              </a:rPr>
+              <a:t>y </a:t>
+            </a:r>
+            <a:r>
+              <a:rPr lang="en-US" dirty="0" err="1">
+                <a:latin typeface="Times New Roman" pitchFamily="18" charset="0"/>
+                <a:cs typeface="Times New Roman" pitchFamily="18" charset="0"/>
+              </a:rPr>
+              <a:t>pisni</a:t>
+            </a:r>
+            <a:r>
+              <a:rPr lang="uk-UA" dirty="0">
+                <a:latin typeface="Times New Roman" pitchFamily="18" charset="0"/>
+                <a:cs typeface="Times New Roman" pitchFamily="18" charset="0"/>
+              </a:rPr>
+              <a:t>.</a:t>
+            </a:r>
+            <a:r>
+              <a:rPr lang="en-US" dirty="0">
+                <a:latin typeface="Times New Roman" pitchFamily="18" charset="0"/>
+                <a:cs typeface="Times New Roman" pitchFamily="18" charset="0"/>
+              </a:rPr>
+              <a:t>org</a:t>
+            </a:r>
+            <a:r>
+              <a:rPr lang="uk-UA" dirty="0">
+                <a:latin typeface="Times New Roman" pitchFamily="18" charset="0"/>
+                <a:cs typeface="Times New Roman" pitchFamily="18" charset="0"/>
+              </a:rPr>
+              <a:t>.</a:t>
+            </a:r>
+            <a:r>
+              <a:rPr lang="en-US" dirty="0" err="1">
+                <a:latin typeface="Times New Roman" pitchFamily="18" charset="0"/>
+                <a:cs typeface="Times New Roman" pitchFamily="18" charset="0"/>
+              </a:rPr>
+              <a:t>ua</a:t>
+            </a:r>
+            <a:r>
+              <a:rPr lang="uk-UA" dirty="0">
+                <a:latin typeface="Times New Roman" pitchFamily="18" charset="0"/>
+                <a:cs typeface="Times New Roman" pitchFamily="18" charset="0"/>
+              </a:rPr>
+              <a:t> та описав </a:t>
+            </a:r>
+            <a:r>
+              <a:rPr lang="en-US" dirty="0" smtClean="0">
+                <a:latin typeface="Times New Roman" pitchFamily="18" charset="0"/>
+                <a:cs typeface="Times New Roman" pitchFamily="18" charset="0"/>
+              </a:rPr>
+              <a:t>Tasks</a:t>
+            </a:r>
+            <a:r>
+              <a:rPr lang="uk-UA" dirty="0" smtClean="0">
+                <a:latin typeface="Times New Roman" pitchFamily="18" charset="0"/>
+                <a:cs typeface="Times New Roman" pitchFamily="18" charset="0"/>
+              </a:rPr>
+              <a:t> </a:t>
+            </a:r>
+            <a:r>
+              <a:rPr lang="uk-UA" dirty="0">
+                <a:latin typeface="Times New Roman" pitchFamily="18" charset="0"/>
+                <a:cs typeface="Times New Roman" pitchFamily="18" charset="0"/>
+              </a:rPr>
+              <a:t>до нього.</a:t>
+            </a:r>
+          </a:p>
+        </p:txBody>
+      </p:sp>
+    </p:spTree>
+    <p:extLst>
+      <p:ext uri="{BB962C8B-B14F-4D97-AF65-F5344CB8AC3E}">
+        <p14:creationId xmlns:p14="http://schemas.microsoft.com/office/powerpoint/2010/main" val="2004168920"/>
+      </p:ext>
+    </p:extLst>
+  </p:cSld>
+  <p:clrMapOvr>
+    <a:masterClrMapping/>
+  </p:clrMapOvr>
+  <p:timing>
+    <p:tnLst>
+      <p:par>
+        <p:cTn id="1" dur="indefinite" restart="never" nodeType="tmRoot"/>
+      </p:par>
+    </p:tnLst>
+  </p:timing>
+</p:sld>
+</file>
+
+<file path=ppt/slides/slide7.xml><?xml version="1.0" encoding="utf-8"?>
+<p:sld xmlns:a="http://schemas.openxmlformats.org/drawingml/2006/main" xmlns:r="http://schemas.openxmlformats.org/officeDocument/2006/relationships" xmlns:p="http://schemas.openxmlformats.org/presentationml/2006/main">
+  <p:cSld>
+    <p:spTree>
+      <p:nvGrpSpPr>
+        <p:cNvPr id="1" name=""/>
+        <p:cNvGrpSpPr/>
+        <p:nvPr/>
+      </p:nvGrpSpPr>
+      <p:grpSpPr>
+        <a:xfrm>
+          <a:off x="0" y="0"/>
+          <a:ext cx="0" cy="0"/>
+          <a:chOff x="0" y="0"/>
+          <a:chExt cx="0" cy="0"/>
+        </a:xfrm>
+      </p:grpSpPr>
+      <p:sp>
+        <p:nvSpPr>
+          <p:cNvPr id="4" name="Заголовок 1"/>
+          <p:cNvSpPr>
+            <a:spLocks noGrp="1"/>
+          </p:cNvSpPr>
+          <p:nvPr>
+            <p:ph type="title"/>
+          </p:nvPr>
+        </p:nvSpPr>
+        <p:spPr>
+          <a:xfrm>
+            <a:off x="395536" y="2564904"/>
+            <a:ext cx="8229600" cy="1143000"/>
+          </a:xfrm>
+        </p:spPr>
+        <p:txBody>
+          <a:bodyPr/>
+          <a:lstStyle/>
+          <a:p>
+            <a:r>
+              <a:rPr lang="uk-UA" dirty="0" smtClean="0">
+                <a:latin typeface="Times New Roman" pitchFamily="18" charset="0"/>
+                <a:cs typeface="Times New Roman" pitchFamily="18" charset="0"/>
+              </a:rPr>
+              <a:t>Дякую за увагу</a:t>
+            </a:r>
+            <a:endParaRPr lang="uk-UA" dirty="0">
+              <a:latin typeface="Times New Roman" pitchFamily="18" charset="0"/>
+              <a:cs typeface="Times New Roman" pitchFamily="18" charset="0"/>
+            </a:endParaRPr>
+          </a:p>
+        </p:txBody>
+      </p:sp>
+    </p:spTree>
+    <p:extLst>
+      <p:ext uri="{BB962C8B-B14F-4D97-AF65-F5344CB8AC3E}">
+        <p14:creationId xmlns:p14="http://schemas.microsoft.com/office/powerpoint/2010/main" val="2229746291"/>
+      </p:ext>
+    </p:extLst>
+  </p:cSld>
+  <p:clrMapOvr>
+    <a:masterClrMapping/>
+  </p:clrMapOvr>
+  <p:timing>
+    <p:tnLst>
+      <p:par>
+        <p:cTn id="1" dur="indefinite" restart="never" nodeType="tmRoot"/>
+      </p:par>
+    </p:tnLst>
+  </p:timing>
+</p:sld>
 </file>
 
 <file path=ppt/theme/theme1.xml><?xml version="1.0" encoding="utf-8"?>

</xml_diff>